<commit_message>
fix: update ppt layout file
</commit_message>
<xml_diff>
--- a/garyng/layouts/34-key numpad.pptx
+++ b/garyng/layouts/34-key numpad.pptx
@@ -6639,6 +6639,278 @@
             <a:endParaRPr lang="en-MY" sz="900" dirty="0">
               <a:solidFill>
                 <a:schemeClr val="tx1"/>
+              </a:solidFill>
+              <a:latin typeface="Fira Code" panose="020B0509050000020004" pitchFamily="49" charset="0"/>
+              <a:ea typeface="Fira Code" panose="020B0509050000020004" pitchFamily="49" charset="0"/>
+            </a:endParaRPr>
+          </a:p>
+        </p:txBody>
+      </p:sp>
+      <p:sp>
+        <p:nvSpPr>
+          <p:cNvPr id="87" name="Rectangle 86">
+            <a:extLst>
+              <a:ext uri="{FF2B5EF4-FFF2-40B4-BE49-F238E27FC236}">
+                <a16:creationId xmlns:a16="http://schemas.microsoft.com/office/drawing/2014/main" id="{1C1C82D4-48AE-4DD5-A476-2DD85D0A6C9C}"/>
+              </a:ext>
+            </a:extLst>
+          </p:cNvPr>
+          <p:cNvSpPr/>
+          <p:nvPr/>
+        </p:nvSpPr>
+        <p:spPr>
+          <a:xfrm>
+            <a:off x="3710070" y="3912286"/>
+            <a:ext cx="576000" cy="576000"/>
+          </a:xfrm>
+          <a:prstGeom prst="rect">
+            <a:avLst/>
+          </a:prstGeom>
+          <a:solidFill>
+            <a:schemeClr val="tx1"/>
+          </a:solidFill>
+          <a:ln>
+            <a:noFill/>
+          </a:ln>
+        </p:spPr>
+        <p:style>
+          <a:lnRef idx="2">
+            <a:schemeClr val="accent1">
+              <a:shade val="50000"/>
+            </a:schemeClr>
+          </a:lnRef>
+          <a:fillRef idx="1">
+            <a:schemeClr val="accent1"/>
+          </a:fillRef>
+          <a:effectRef idx="0">
+            <a:schemeClr val="accent1"/>
+          </a:effectRef>
+          <a:fontRef idx="minor">
+            <a:schemeClr val="lt1"/>
+          </a:fontRef>
+        </p:style>
+        <p:txBody>
+          <a:bodyPr rtlCol="0" anchor="ctr"/>
+          <a:lstStyle/>
+          <a:p>
+            <a:pPr algn="ctr"/>
+            <a:r>
+              <a:rPr lang="en-US" sz="1100" dirty="0">
+                <a:solidFill>
+                  <a:schemeClr val="bg1"/>
+                </a:solidFill>
+                <a:latin typeface="Fira Code" panose="020B0509050000020004" pitchFamily="49" charset="0"/>
+                <a:ea typeface="Fira Code" panose="020B0509050000020004" pitchFamily="49" charset="0"/>
+              </a:rPr>
+              <a:t>A</a:t>
+            </a:r>
+            <a:endParaRPr lang="en-MY" sz="1100" dirty="0">
+              <a:solidFill>
+                <a:schemeClr val="bg1"/>
+              </a:solidFill>
+              <a:latin typeface="Fira Code" panose="020B0509050000020004" pitchFamily="49" charset="0"/>
+              <a:ea typeface="Fira Code" panose="020B0509050000020004" pitchFamily="49" charset="0"/>
+            </a:endParaRPr>
+          </a:p>
+        </p:txBody>
+      </p:sp>
+      <p:sp>
+        <p:nvSpPr>
+          <p:cNvPr id="88" name="Rectangle 87">
+            <a:extLst>
+              <a:ext uri="{FF2B5EF4-FFF2-40B4-BE49-F238E27FC236}">
+                <a16:creationId xmlns:a16="http://schemas.microsoft.com/office/drawing/2014/main" id="{16A8C828-1F69-4113-BED0-7C87F59CEC5C}"/>
+              </a:ext>
+            </a:extLst>
+          </p:cNvPr>
+          <p:cNvSpPr/>
+          <p:nvPr/>
+        </p:nvSpPr>
+        <p:spPr>
+          <a:xfrm>
+            <a:off x="4593990" y="3912286"/>
+            <a:ext cx="576000" cy="576000"/>
+          </a:xfrm>
+          <a:prstGeom prst="rect">
+            <a:avLst/>
+          </a:prstGeom>
+          <a:solidFill>
+            <a:schemeClr val="tx1"/>
+          </a:solidFill>
+          <a:ln>
+            <a:noFill/>
+          </a:ln>
+        </p:spPr>
+        <p:style>
+          <a:lnRef idx="2">
+            <a:schemeClr val="accent1">
+              <a:shade val="50000"/>
+            </a:schemeClr>
+          </a:lnRef>
+          <a:fillRef idx="1">
+            <a:schemeClr val="accent1"/>
+          </a:fillRef>
+          <a:effectRef idx="0">
+            <a:schemeClr val="accent1"/>
+          </a:effectRef>
+          <a:fontRef idx="minor">
+            <a:schemeClr val="lt1"/>
+          </a:fontRef>
+        </p:style>
+        <p:txBody>
+          <a:bodyPr rtlCol="0" anchor="ctr"/>
+          <a:lstStyle/>
+          <a:p>
+            <a:pPr algn="ctr"/>
+            <a:r>
+              <a:rPr lang="en-US" sz="1100" dirty="0">
+                <a:solidFill>
+                  <a:schemeClr val="bg1"/>
+                </a:solidFill>
+                <a:latin typeface="Fira Code" panose="020B0509050000020004" pitchFamily="49" charset="0"/>
+                <a:ea typeface="Fira Code" panose="020B0509050000020004" pitchFamily="49" charset="0"/>
+              </a:rPr>
+              <a:t>B</a:t>
+            </a:r>
+            <a:endParaRPr lang="en-MY" sz="1100" dirty="0">
+              <a:solidFill>
+                <a:schemeClr val="bg1"/>
+              </a:solidFill>
+              <a:latin typeface="Fira Code" panose="020B0509050000020004" pitchFamily="49" charset="0"/>
+              <a:ea typeface="Fira Code" panose="020B0509050000020004" pitchFamily="49" charset="0"/>
+            </a:endParaRPr>
+          </a:p>
+        </p:txBody>
+      </p:sp>
+      <p:sp>
+        <p:nvSpPr>
+          <p:cNvPr id="89" name="Rectangle 88">
+            <a:extLst>
+              <a:ext uri="{FF2B5EF4-FFF2-40B4-BE49-F238E27FC236}">
+                <a16:creationId xmlns:a16="http://schemas.microsoft.com/office/drawing/2014/main" id="{4A151916-0BA9-4B76-8EE0-520A028D03F3}"/>
+              </a:ext>
+            </a:extLst>
+          </p:cNvPr>
+          <p:cNvSpPr/>
+          <p:nvPr/>
+        </p:nvSpPr>
+        <p:spPr>
+          <a:xfrm>
+            <a:off x="5477910" y="3912286"/>
+            <a:ext cx="576000" cy="576000"/>
+          </a:xfrm>
+          <a:prstGeom prst="rect">
+            <a:avLst/>
+          </a:prstGeom>
+          <a:solidFill>
+            <a:schemeClr val="tx1"/>
+          </a:solidFill>
+          <a:ln>
+            <a:noFill/>
+          </a:ln>
+        </p:spPr>
+        <p:style>
+          <a:lnRef idx="2">
+            <a:schemeClr val="accent1">
+              <a:shade val="50000"/>
+            </a:schemeClr>
+          </a:lnRef>
+          <a:fillRef idx="1">
+            <a:schemeClr val="accent1"/>
+          </a:fillRef>
+          <a:effectRef idx="0">
+            <a:schemeClr val="accent1"/>
+          </a:effectRef>
+          <a:fontRef idx="minor">
+            <a:schemeClr val="lt1"/>
+          </a:fontRef>
+        </p:style>
+        <p:txBody>
+          <a:bodyPr rtlCol="0" anchor="ctr"/>
+          <a:lstStyle/>
+          <a:p>
+            <a:pPr algn="ctr"/>
+            <a:r>
+              <a:rPr lang="en-US" sz="1100" dirty="0">
+                <a:solidFill>
+                  <a:schemeClr val="bg1"/>
+                </a:solidFill>
+                <a:latin typeface="Fira Code" panose="020B0509050000020004" pitchFamily="49" charset="0"/>
+                <a:ea typeface="Fira Code" panose="020B0509050000020004" pitchFamily="49" charset="0"/>
+              </a:rPr>
+              <a:t>C</a:t>
+            </a:r>
+            <a:endParaRPr lang="en-MY" sz="1100" dirty="0">
+              <a:solidFill>
+                <a:schemeClr val="bg1"/>
+              </a:solidFill>
+              <a:latin typeface="Fira Code" panose="020B0509050000020004" pitchFamily="49" charset="0"/>
+              <a:ea typeface="Fira Code" panose="020B0509050000020004" pitchFamily="49" charset="0"/>
+            </a:endParaRPr>
+          </a:p>
+        </p:txBody>
+      </p:sp>
+      <p:sp>
+        <p:nvSpPr>
+          <p:cNvPr id="90" name="Rectangle 89">
+            <a:extLst>
+              <a:ext uri="{FF2B5EF4-FFF2-40B4-BE49-F238E27FC236}">
+                <a16:creationId xmlns:a16="http://schemas.microsoft.com/office/drawing/2014/main" id="{FE096913-11EF-4E51-9F1E-9C35FF608E10}"/>
+              </a:ext>
+            </a:extLst>
+          </p:cNvPr>
+          <p:cNvSpPr/>
+          <p:nvPr/>
+        </p:nvSpPr>
+        <p:spPr>
+          <a:xfrm>
+            <a:off x="6361830" y="3912286"/>
+            <a:ext cx="576000" cy="576000"/>
+          </a:xfrm>
+          <a:prstGeom prst="rect">
+            <a:avLst/>
+          </a:prstGeom>
+          <a:solidFill>
+            <a:schemeClr val="tx1"/>
+          </a:solidFill>
+          <a:ln>
+            <a:noFill/>
+          </a:ln>
+        </p:spPr>
+        <p:style>
+          <a:lnRef idx="2">
+            <a:schemeClr val="accent1">
+              <a:shade val="50000"/>
+            </a:schemeClr>
+          </a:lnRef>
+          <a:fillRef idx="1">
+            <a:schemeClr val="accent1"/>
+          </a:fillRef>
+          <a:effectRef idx="0">
+            <a:schemeClr val="accent1"/>
+          </a:effectRef>
+          <a:fontRef idx="minor">
+            <a:schemeClr val="lt1"/>
+          </a:fontRef>
+        </p:style>
+        <p:txBody>
+          <a:bodyPr rtlCol="0" anchor="ctr"/>
+          <a:lstStyle/>
+          <a:p>
+            <a:pPr algn="ctr"/>
+            <a:r>
+              <a:rPr lang="en-US" sz="1100" dirty="0">
+                <a:solidFill>
+                  <a:schemeClr val="bg1"/>
+                </a:solidFill>
+                <a:latin typeface="Fira Code" panose="020B0509050000020004" pitchFamily="49" charset="0"/>
+                <a:ea typeface="Fira Code" panose="020B0509050000020004" pitchFamily="49" charset="0"/>
+              </a:rPr>
+              <a:t>D</a:t>
+            </a:r>
+            <a:endParaRPr lang="en-MY" sz="1100" dirty="0">
+              <a:solidFill>
+                <a:schemeClr val="bg1"/>
               </a:solidFill>
               <a:latin typeface="Fira Code" panose="020B0509050000020004" pitchFamily="49" charset="0"/>
               <a:ea typeface="Fira Code" panose="020B0509050000020004" pitchFamily="49" charset="0"/>

</xml_diff>